<commit_message>
Added names and student number
</commit_message>
<xml_diff>
--- a/CA2 Identifying Wafer Failures with Deep Learning2.pptx
+++ b/CA2 Identifying Wafer Failures with Deep Learning2.pptx
@@ -282,7 +282,7 @@
           <a:p>
             <a:fld id="{FD7289CB-BA1E-4861-BA4E-15B1674C31F8}" type="datetimeFigureOut">
               <a:rPr lang="en-US" smtClean="0"/>
-              <a:t>9/19/2019</a:t>
+              <a:t>9/20/2019</a:t>
             </a:fld>
             <a:endParaRPr lang="en-US"/>
           </a:p>
@@ -480,7 +480,7 @@
           <a:p>
             <a:fld id="{FD7289CB-BA1E-4861-BA4E-15B1674C31F8}" type="datetimeFigureOut">
               <a:rPr lang="en-US" smtClean="0"/>
-              <a:t>9/19/2019</a:t>
+              <a:t>9/20/2019</a:t>
             </a:fld>
             <a:endParaRPr lang="en-US"/>
           </a:p>
@@ -688,7 +688,7 @@
           <a:p>
             <a:fld id="{FD7289CB-BA1E-4861-BA4E-15B1674C31F8}" type="datetimeFigureOut">
               <a:rPr lang="en-US" smtClean="0"/>
-              <a:t>9/19/2019</a:t>
+              <a:t>9/20/2019</a:t>
             </a:fld>
             <a:endParaRPr lang="en-US"/>
           </a:p>
@@ -886,7 +886,7 @@
           <a:p>
             <a:fld id="{FD7289CB-BA1E-4861-BA4E-15B1674C31F8}" type="datetimeFigureOut">
               <a:rPr lang="en-US" smtClean="0"/>
-              <a:t>9/19/2019</a:t>
+              <a:t>9/20/2019</a:t>
             </a:fld>
             <a:endParaRPr lang="en-US"/>
           </a:p>
@@ -1161,7 +1161,7 @@
           <a:p>
             <a:fld id="{FD7289CB-BA1E-4861-BA4E-15B1674C31F8}" type="datetimeFigureOut">
               <a:rPr lang="en-US" smtClean="0"/>
-              <a:t>9/19/2019</a:t>
+              <a:t>9/20/2019</a:t>
             </a:fld>
             <a:endParaRPr lang="en-US"/>
           </a:p>
@@ -1426,7 +1426,7 @@
           <a:p>
             <a:fld id="{FD7289CB-BA1E-4861-BA4E-15B1674C31F8}" type="datetimeFigureOut">
               <a:rPr lang="en-US" smtClean="0"/>
-              <a:t>9/19/2019</a:t>
+              <a:t>9/20/2019</a:t>
             </a:fld>
             <a:endParaRPr lang="en-US"/>
           </a:p>
@@ -1838,7 +1838,7 @@
           <a:p>
             <a:fld id="{FD7289CB-BA1E-4861-BA4E-15B1674C31F8}" type="datetimeFigureOut">
               <a:rPr lang="en-US" smtClean="0"/>
-              <a:t>9/19/2019</a:t>
+              <a:t>9/20/2019</a:t>
             </a:fld>
             <a:endParaRPr lang="en-US"/>
           </a:p>
@@ -1979,7 +1979,7 @@
           <a:p>
             <a:fld id="{FD7289CB-BA1E-4861-BA4E-15B1674C31F8}" type="datetimeFigureOut">
               <a:rPr lang="en-US" smtClean="0"/>
-              <a:t>9/19/2019</a:t>
+              <a:t>9/20/2019</a:t>
             </a:fld>
             <a:endParaRPr lang="en-US"/>
           </a:p>
@@ -2092,7 +2092,7 @@
           <a:p>
             <a:fld id="{FD7289CB-BA1E-4861-BA4E-15B1674C31F8}" type="datetimeFigureOut">
               <a:rPr lang="en-US" smtClean="0"/>
-              <a:t>9/19/2019</a:t>
+              <a:t>9/20/2019</a:t>
             </a:fld>
             <a:endParaRPr lang="en-US"/>
           </a:p>
@@ -2403,7 +2403,7 @@
           <a:p>
             <a:fld id="{FD7289CB-BA1E-4861-BA4E-15B1674C31F8}" type="datetimeFigureOut">
               <a:rPr lang="en-US" smtClean="0"/>
-              <a:t>9/19/2019</a:t>
+              <a:t>9/20/2019</a:t>
             </a:fld>
             <a:endParaRPr lang="en-US"/>
           </a:p>
@@ -2691,7 +2691,7 @@
           <a:p>
             <a:fld id="{FD7289CB-BA1E-4861-BA4E-15B1674C31F8}" type="datetimeFigureOut">
               <a:rPr lang="en-US" smtClean="0"/>
-              <a:t>9/19/2019</a:t>
+              <a:t>9/20/2019</a:t>
             </a:fld>
             <a:endParaRPr lang="en-US"/>
           </a:p>
@@ -2932,7 +2932,7 @@
           <a:p>
             <a:fld id="{FD7289CB-BA1E-4861-BA4E-15B1674C31F8}" type="datetimeFigureOut">
               <a:rPr lang="en-US" smtClean="0"/>
-              <a:t>9/19/2019</a:t>
+              <a:t>9/20/2019</a:t>
             </a:fld>
             <a:endParaRPr lang="en-US"/>
           </a:p>
@@ -3532,8 +3532,8 @@
         </p:nvSpPr>
         <p:spPr>
           <a:xfrm>
-            <a:off x="7454285" y="4509856"/>
-            <a:ext cx="3030244" cy="1200329"/>
+            <a:off x="7322400" y="4509856"/>
+            <a:ext cx="4854992" cy="1200329"/>
           </a:xfrm>
           <a:prstGeom prst="rect">
             <a:avLst/>
@@ -3586,8 +3586,21 @@
                   <a:schemeClr val="bg1"/>
                 </a:solidFill>
               </a:rPr>
-              <a:t>Ong  Boon Ping</a:t>
-            </a:r>
+              <a:t>Ong  Boon </a:t>
+            </a:r>
+            <a:r>
+              <a:rPr lang="en-US" sz="2400">
+                <a:solidFill>
+                  <a:schemeClr val="bg1"/>
+                </a:solidFill>
+              </a:rPr>
+              <a:t>Ping                 A0195172B</a:t>
+            </a:r>
+            <a:endParaRPr lang="en-US" sz="2400" dirty="0">
+              <a:solidFill>
+                <a:schemeClr val="bg1"/>
+              </a:solidFill>
+            </a:endParaRPr>
           </a:p>
           <a:p>
             <a:r>
@@ -3596,7 +3609,7 @@
                   <a:schemeClr val="bg1"/>
                 </a:solidFill>
               </a:rPr>
-              <a:t>Tan Chin Gee</a:t>
+              <a:t>Tan Chin Gee                     A0195296M</a:t>
             </a:r>
           </a:p>
           <a:p>
@@ -3622,7 +3635,7 @@
                   <a:schemeClr val="bg1"/>
                 </a:solidFill>
               </a:rPr>
-              <a:t> Francis</a:t>
+              <a:t> Francis    A0195414A</a:t>
             </a:r>
             <a:endParaRPr lang="en-SG" sz="2400" dirty="0">
               <a:solidFill>

</xml_diff>